<commit_message>
added new final practice
</commit_message>
<xml_diff>
--- a/Bootcamp/html-uvod/html-uvod.pptx
+++ b/Bootcamp/html-uvod/html-uvod.pptx
@@ -263,7 +263,7 @@
           <a:p>
             <a:fld id="{B2A70591-2E3C-5F42-A4E1-C0F5A0F4E5DB}" type="datetimeFigureOut">
               <a:rPr lang="en-US" smtClean="0"/>
-              <a:t>4/24/2025</a:t>
+              <a:t>4/27/2025</a:t>
             </a:fld>
             <a:endParaRPr lang="en-US"/>
           </a:p>
@@ -1369,6 +1369,104 @@
 </p:notes>
 </file>
 
+<file path=ppt/notesSlides/notesSlide17.xml><?xml version="1.0" encoding="utf-8"?>
+<p:notes xmlns:a="http://schemas.openxmlformats.org/drawingml/2006/main" xmlns:r="http://schemas.openxmlformats.org/officeDocument/2006/relationships" xmlns:p="http://schemas.openxmlformats.org/presentationml/2006/main">
+  <p:cSld>
+    <p:spTree>
+      <p:nvGrpSpPr>
+        <p:cNvPr id="1" name=""/>
+        <p:cNvGrpSpPr/>
+        <p:nvPr/>
+      </p:nvGrpSpPr>
+      <p:grpSpPr>
+        <a:xfrm>
+          <a:off x="0" y="0"/>
+          <a:ext cx="0" cy="0"/>
+          <a:chOff x="0" y="0"/>
+          <a:chExt cx="0" cy="0"/>
+        </a:xfrm>
+      </p:grpSpPr>
+      <p:sp>
+        <p:nvSpPr>
+          <p:cNvPr id="2" name="Slide Image Placeholder 1"/>
+          <p:cNvSpPr>
+            <a:spLocks noGrp="1" noRot="1" noChangeAspect="1"/>
+          </p:cNvSpPr>
+          <p:nvPr>
+            <p:ph type="sldImg"/>
+          </p:nvPr>
+        </p:nvSpPr>
+        <p:spPr/>
+      </p:sp>
+      <p:sp>
+        <p:nvSpPr>
+          <p:cNvPr id="3" name="Notes Placeholder 2"/>
+          <p:cNvSpPr>
+            <a:spLocks noGrp="1"/>
+          </p:cNvSpPr>
+          <p:nvPr>
+            <p:ph type="body" idx="1"/>
+          </p:nvPr>
+        </p:nvSpPr>
+        <p:spPr/>
+        <p:txBody>
+          <a:bodyPr/>
+          <a:lstStyle/>
+          <a:p>
+            <a:r>
+              <a:rPr lang="hr-HR" dirty="0"/>
+              <a:t>https://docs.google.com/document/d/1eJrPLGON9uT088ZXSvQLK9HB-NnRr-I-rpjihxeZjqA/edit?usp=sharing</a:t>
+            </a:r>
+            <a:br>
+              <a:rPr lang="en-US" dirty="0"/>
+            </a:br>
+            <a:br>
+              <a:rPr lang="en-US" dirty="0"/>
+            </a:br>
+            <a:r>
+              <a:rPr lang="en-US" dirty="0"/>
+              <a:t>https://dinoduvnjak.github.io/portfolio/index.html</a:t>
+            </a:r>
+            <a:endParaRPr lang="hr-HR" dirty="0"/>
+          </a:p>
+        </p:txBody>
+      </p:sp>
+      <p:sp>
+        <p:nvSpPr>
+          <p:cNvPr id="4" name="Slide Number Placeholder 3"/>
+          <p:cNvSpPr>
+            <a:spLocks noGrp="1"/>
+          </p:cNvSpPr>
+          <p:nvPr>
+            <p:ph type="sldNum" sz="quarter" idx="5"/>
+          </p:nvPr>
+        </p:nvSpPr>
+        <p:spPr/>
+        <p:txBody>
+          <a:bodyPr/>
+          <a:lstStyle/>
+          <a:p>
+            <a:fld id="{343B951A-A665-1949-AEDB-B62DC9BE7F13}" type="slidenum">
+              <a:rPr lang="en-US" smtClean="0"/>
+              <a:t>22</a:t>
+            </a:fld>
+            <a:endParaRPr lang="en-US"/>
+          </a:p>
+        </p:txBody>
+      </p:sp>
+    </p:spTree>
+    <p:extLst>
+      <p:ext uri="{BB962C8B-B14F-4D97-AF65-F5344CB8AC3E}">
+        <p14:creationId xmlns:p14="http://schemas.microsoft.com/office/powerpoint/2010/main" val="2063423346"/>
+      </p:ext>
+    </p:extLst>
+  </p:cSld>
+  <p:clrMapOvr>
+    <a:masterClrMapping/>
+  </p:clrMapOvr>
+</p:notes>
+</file>
+
 <file path=ppt/notesSlides/notesSlide2.xml><?xml version="1.0" encoding="utf-8"?>
 <p:notes xmlns:a="http://schemas.openxmlformats.org/drawingml/2006/main" xmlns:r="http://schemas.openxmlformats.org/officeDocument/2006/relationships" xmlns:p="http://schemas.openxmlformats.org/presentationml/2006/main">
   <p:cSld>
@@ -4458,7 +4556,7 @@
                 <a:ea typeface="Open Sans" panose="020B0606030504020204" pitchFamily="34" charset="0"/>
                 <a:cs typeface="Open Sans" panose="020B0606030504020204" pitchFamily="34" charset="0"/>
               </a:rPr>
-              <a:t>24/04/2025</a:t>
+              <a:t>27/04/2025</a:t>
             </a:fld>
             <a:endParaRPr lang="en-GB" sz="1800" b="0" i="0" kern="1200" dirty="0">
               <a:solidFill>
@@ -5203,7 +5301,7 @@
                 <a:ea typeface="Open Sans" panose="020B0606030504020204" pitchFamily="34" charset="0"/>
                 <a:cs typeface="Open Sans" panose="020B0606030504020204" pitchFamily="34" charset="0"/>
               </a:rPr>
-              <a:t>24/04/2025</a:t>
+              <a:t>27/04/2025</a:t>
             </a:fld>
             <a:endParaRPr lang="en-GB" sz="1800" b="0" i="0" kern="1200" dirty="0">
               <a:solidFill>
@@ -5726,7 +5824,7 @@
                 <a:ea typeface="Open Sans" panose="020B0606030504020204" pitchFamily="34" charset="0"/>
                 <a:cs typeface="Open Sans" panose="020B0606030504020204" pitchFamily="34" charset="0"/>
               </a:rPr>
-              <a:t>24/04/2025</a:t>
+              <a:t>27/04/2025</a:t>
             </a:fld>
             <a:endParaRPr lang="en-GB" sz="1800" b="0" i="0" kern="1200" dirty="0">
               <a:solidFill>
@@ -6692,7 +6790,7 @@
                 <a:ea typeface="Open Sans" panose="020B0606030504020204" pitchFamily="34" charset="0"/>
                 <a:cs typeface="Open Sans" panose="020B0606030504020204" pitchFamily="34" charset="0"/>
               </a:rPr>
-              <a:t>24/04/2025</a:t>
+              <a:t>27/04/2025</a:t>
             </a:fld>
             <a:endParaRPr lang="en-GB" sz="1800" b="0" i="0" kern="1200" dirty="0">
               <a:solidFill>
@@ -7131,7 +7229,7 @@
                 <a:ea typeface="Open Sans" panose="020B0606030504020204" pitchFamily="34" charset="0"/>
                 <a:cs typeface="Open Sans" panose="020B0606030504020204" pitchFamily="34" charset="0"/>
               </a:rPr>
-              <a:t>24/04/2025</a:t>
+              <a:t>27/04/2025</a:t>
             </a:fld>
             <a:endParaRPr lang="en-GB" sz="1800" b="0" i="0" kern="1200" dirty="0">
               <a:solidFill>
@@ -8901,7 +8999,7 @@
                 <a:ea typeface="Open Sans" pitchFamily="2" charset="0"/>
                 <a:cs typeface="Open Sans" pitchFamily="2" charset="0"/>
               </a:rPr>
-              <a:t>24/04/2025</a:t>
+              <a:t>27/04/2025</a:t>
             </a:fld>
             <a:endParaRPr lang="en-GB" sz="1800" b="0" i="0" kern="1200" dirty="0">
               <a:solidFill>
@@ -10651,7 +10749,7 @@
                 <a:ea typeface="Open Sans" pitchFamily="2" charset="0"/>
                 <a:cs typeface="Open Sans" pitchFamily="2" charset="0"/>
               </a:rPr>
-              <a:t>24/04/2025</a:t>
+              <a:t>27/04/2025</a:t>
             </a:fld>
             <a:endParaRPr lang="en-GB" sz="1800" b="0" i="0" kern="1200" dirty="0">
               <a:solidFill>
@@ -11168,7 +11266,7 @@
                 <a:ea typeface="Open Sans" panose="020B0606030504020204" pitchFamily="34" charset="0"/>
                 <a:cs typeface="Open Sans" panose="020B0606030504020204" pitchFamily="34" charset="0"/>
               </a:rPr>
-              <a:t>24/04/2025</a:t>
+              <a:t>27/04/2025</a:t>
             </a:fld>
             <a:endParaRPr lang="en-GB" sz="1800" b="0" i="0" kern="1200" dirty="0">
               <a:solidFill>
@@ -11765,7 +11863,7 @@
                 <a:ea typeface="Open Sans" pitchFamily="2" charset="0"/>
                 <a:cs typeface="Open Sans" pitchFamily="2" charset="0"/>
               </a:rPr>
-              <a:t>24/04/2025</a:t>
+              <a:t>27/04/2025</a:t>
             </a:fld>
             <a:endParaRPr lang="en-GB" sz="1800" b="0" i="0" kern="1200" dirty="0">
               <a:solidFill>
@@ -12305,7 +12403,7 @@
                 <a:ea typeface="Open Sans" panose="020B0606030504020204" pitchFamily="34" charset="0"/>
                 <a:cs typeface="Open Sans" panose="020B0606030504020204" pitchFamily="34" charset="0"/>
               </a:rPr>
-              <a:t>24/04/2025</a:t>
+              <a:t>27/04/2025</a:t>
             </a:fld>
             <a:endParaRPr lang="en-GB" sz="1800" b="0" i="0" kern="1200" dirty="0">
               <a:solidFill>
@@ -13006,7 +13104,7 @@
                 <a:ea typeface="Open Sans" panose="020B0606030504020204" pitchFamily="34" charset="0"/>
                 <a:cs typeface="Open Sans" panose="020B0606030504020204" pitchFamily="34" charset="0"/>
               </a:rPr>
-              <a:t>24/04/2025</a:t>
+              <a:t>27/04/2025</a:t>
             </a:fld>
             <a:endParaRPr lang="en-GB" sz="1800" b="0" i="0" kern="1200" dirty="0">
               <a:solidFill>
@@ -13369,7 +13467,7 @@
                 <a:ea typeface="Open Sans" pitchFamily="2" charset="0"/>
                 <a:cs typeface="Open Sans" pitchFamily="2" charset="0"/>
               </a:rPr>
-              <a:t>24/04/2025</a:t>
+              <a:t>27/04/2025</a:t>
             </a:fld>
             <a:endParaRPr lang="en-GB" sz="1800" b="0" i="0" kern="1200" dirty="0">
               <a:solidFill>
@@ -13764,7 +13862,7 @@
                 <a:ea typeface="Open Sans" pitchFamily="2" charset="0"/>
                 <a:cs typeface="Open Sans" pitchFamily="2" charset="0"/>
               </a:rPr>
-              <a:t>24/04/2025</a:t>
+              <a:t>27/04/2025</a:t>
             </a:fld>
             <a:endParaRPr lang="en-GB" sz="1800" b="0" i="0" kern="1200" dirty="0">
               <a:solidFill>
@@ -19400,193 +19498,39 @@
       </p:sp>
       <p:sp>
         <p:nvSpPr>
-          <p:cNvPr id="8" name="Text Placeholder 5">
-            <a:extLst>
-              <a:ext uri="{FF2B5EF4-FFF2-40B4-BE49-F238E27FC236}">
-                <a16:creationId xmlns:a16="http://schemas.microsoft.com/office/drawing/2014/main" id="{DF5068FB-3941-C9EA-80C4-C54D6D99BACB}"/>
-              </a:ext>
-            </a:extLst>
-          </p:cNvPr>
-          <p:cNvSpPr>
-            <a:spLocks noGrp="1"/>
-          </p:cNvSpPr>
-          <p:nvPr>
-            <p:ph type="subTitle" idx="1"/>
-          </p:nvPr>
+          <p:cNvPr id="9" name="TextBox 8">
+            <a:extLst>
+              <a:ext uri="{FF2B5EF4-FFF2-40B4-BE49-F238E27FC236}">
+                <a16:creationId xmlns:a16="http://schemas.microsoft.com/office/drawing/2014/main" id="{5BC3553C-ABE6-88CA-BF0A-1DE5DF80A8B1}"/>
+              </a:ext>
+            </a:extLst>
+          </p:cNvPr>
+          <p:cNvSpPr txBox="1"/>
+          <p:nvPr/>
         </p:nvSpPr>
         <p:spPr>
           <a:xfrm>
-            <a:off x="1061483" y="2213230"/>
-            <a:ext cx="9144000" cy="4040085"/>
-          </a:xfrm>
+            <a:off x="2987299" y="2524649"/>
+            <a:ext cx="6102456" cy="646331"/>
+          </a:xfrm>
+          <a:prstGeom prst="rect">
+            <a:avLst/>
+          </a:prstGeom>
+          <a:noFill/>
         </p:spPr>
         <p:txBody>
-          <a:bodyPr>
-            <a:noAutofit/>
+          <a:bodyPr wrap="square">
+            <a:spAutoFit/>
           </a:bodyPr>
           <a:lstStyle/>
           <a:p>
             <a:r>
-              <a:rPr lang="en-US" sz="1200" dirty="0" err="1"/>
-              <a:t>Implementirajte</a:t>
-            </a:r>
-            <a:r>
-              <a:rPr lang="en-US" sz="1200" dirty="0"/>
-              <a:t> </a:t>
-            </a:r>
-            <a:r>
-              <a:rPr lang="en-US" sz="1200" dirty="0" err="1"/>
-              <a:t>stranicu</a:t>
-            </a:r>
-            <a:r>
-              <a:rPr lang="en-US" sz="1200" dirty="0"/>
-              <a:t> u HTML-u koji </a:t>
-            </a:r>
-            <a:r>
-              <a:rPr lang="en-US" sz="1200" dirty="0" err="1"/>
-              <a:t>sadrzi</a:t>
-            </a:r>
-            <a:r>
-              <a:rPr lang="en-US" sz="1200" dirty="0"/>
-              <a:t> </a:t>
-            </a:r>
-            <a:r>
-              <a:rPr lang="en-US" sz="1200" dirty="0" err="1"/>
-              <a:t>sljedece</a:t>
-            </a:r>
-            <a:r>
-              <a:rPr lang="en-US" sz="1200" dirty="0"/>
-              <a:t>:</a:t>
-            </a:r>
-          </a:p>
-          <a:p>
-            <a:r>
-              <a:rPr lang="en-US" sz="1200" dirty="0" err="1"/>
-              <a:t>Stranice</a:t>
-            </a:r>
-            <a:r>
-              <a:rPr lang="en-US" sz="1200" dirty="0"/>
-              <a:t>:</a:t>
-            </a:r>
-          </a:p>
-          <a:p>
-            <a:r>
-              <a:rPr lang="en-US" sz="1200" dirty="0"/>
-              <a:t>- Login</a:t>
-            </a:r>
-          </a:p>
-          <a:p>
-            <a:r>
-              <a:rPr lang="en-US" sz="1200" dirty="0"/>
-              <a:t>- Register</a:t>
-            </a:r>
-          </a:p>
-          <a:p>
-            <a:r>
-              <a:rPr lang="en-US" sz="1200" dirty="0"/>
-              <a:t>- Lista </a:t>
-            </a:r>
-            <a:r>
-              <a:rPr lang="en-US" sz="1200" dirty="0" err="1"/>
-              <a:t>dućana</a:t>
-            </a:r>
-            <a:endParaRPr lang="en-US" sz="1200" dirty="0"/>
-          </a:p>
-          <a:p>
-            <a:r>
-              <a:rPr lang="en-US" sz="1200" dirty="0"/>
-              <a:t>- Lista </a:t>
-            </a:r>
-            <a:r>
-              <a:rPr lang="en-US" sz="1200" dirty="0" err="1"/>
-              <a:t>itema</a:t>
-            </a:r>
-            <a:endParaRPr lang="en-US" sz="1200" dirty="0"/>
-          </a:p>
-          <a:p>
-            <a:r>
-              <a:rPr lang="en-US" sz="1200" dirty="0"/>
-              <a:t>- </a:t>
-            </a:r>
-            <a:r>
-              <a:rPr lang="en-US" sz="1200" dirty="0" err="1"/>
-              <a:t>Kreiranje</a:t>
-            </a:r>
-            <a:r>
-              <a:rPr lang="en-US" sz="1200" dirty="0"/>
-              <a:t> </a:t>
-            </a:r>
-            <a:r>
-              <a:rPr lang="en-US" sz="1200" dirty="0" err="1"/>
-              <a:t>ducana</a:t>
-            </a:r>
-            <a:endParaRPr lang="en-US" sz="1200" dirty="0"/>
-          </a:p>
-          <a:p>
-            <a:pPr marL="285750" indent="-285750">
-              <a:buFontTx/>
-              <a:buChar char="-"/>
-            </a:pPr>
-            <a:r>
-              <a:rPr lang="en-US" sz="1200" dirty="0" err="1"/>
-              <a:t>Kreiranje</a:t>
-            </a:r>
-            <a:r>
-              <a:rPr lang="en-US" sz="1200" dirty="0"/>
-              <a:t> item-a</a:t>
-            </a:r>
-          </a:p>
-          <a:p>
-            <a:pPr marL="285750" indent="-285750">
-              <a:buFontTx/>
-              <a:buChar char="-"/>
-            </a:pPr>
-            <a:endParaRPr lang="en-US" sz="1200" dirty="0"/>
-          </a:p>
-          <a:p>
-            <a:r>
-              <a:rPr lang="en-US" sz="1200" dirty="0"/>
-              <a:t>- </a:t>
-            </a:r>
-            <a:r>
-              <a:rPr lang="en-US" sz="1200" dirty="0" err="1"/>
-              <a:t>Napravite</a:t>
-            </a:r>
-            <a:r>
-              <a:rPr lang="en-US" sz="1200" dirty="0"/>
-              <a:t> git </a:t>
-            </a:r>
-            <a:r>
-              <a:rPr lang="en-US" sz="1200" dirty="0" err="1"/>
-              <a:t>repositorij</a:t>
-            </a:r>
-            <a:r>
-              <a:rPr lang="en-US" sz="1200" dirty="0"/>
-              <a:t> </a:t>
-            </a:r>
-            <a:r>
-              <a:rPr lang="en-US" sz="1200" dirty="0" err="1"/>
-              <a:t>i</a:t>
-            </a:r>
-            <a:r>
-              <a:rPr lang="en-US" sz="1200" dirty="0"/>
-              <a:t> </a:t>
-            </a:r>
-            <a:r>
-              <a:rPr lang="en-US" sz="1200" dirty="0" err="1"/>
-              <a:t>azurirajte</a:t>
-            </a:r>
-            <a:r>
-              <a:rPr lang="en-US" sz="1200" dirty="0"/>
-              <a:t> </a:t>
-            </a:r>
-            <a:r>
-              <a:rPr lang="en-US" sz="1200" dirty="0" err="1"/>
-              <a:t>kod</a:t>
-            </a:r>
-            <a:r>
-              <a:rPr lang="en-US" sz="1200" dirty="0"/>
-              <a:t>.</a:t>
+              <a:rPr lang="hr-HR" dirty="0">
+                <a:solidFill>
+                  <a:schemeClr val="bg1"/>
+                </a:solidFill>
+              </a:rPr>
+              <a:t>https://docs.google.com/document/d/1eJrPLGON9uT088ZXSvQLK9HB-NnRr-I-rpjihxeZjqA/edit?usp=sharing</a:t>
             </a:r>
           </a:p>
         </p:txBody>
@@ -22865,12 +22809,14 @@
 </file>
 
 <file path=customXml/item1.xml><?xml version="1.0" encoding="utf-8"?>
-<?mso-contentType ?>
-<FormTemplates xmlns="http://schemas.microsoft.com/sharepoint/v3/contenttype/forms">
-  <Display>DocumentLibraryForm</Display>
-  <Edit>DocumentLibraryForm</Edit>
-  <New>DocumentLibraryForm</New>
-</FormTemplates>
+<p:properties xmlns:p="http://schemas.microsoft.com/office/2006/metadata/properties" xmlns:xsi="http://www.w3.org/2001/XMLSchema-instance" xmlns:pc="http://schemas.microsoft.com/office/infopath/2007/PartnerControls">
+  <documentManagement>
+    <lcf76f155ced4ddcb4097134ff3c332f xmlns="40806f44-bc4a-4ea4-b660-c6da93f8f179">
+      <Terms xmlns="http://schemas.microsoft.com/office/infopath/2007/PartnerControls"/>
+    </lcf76f155ced4ddcb4097134ff3c332f>
+    <TaxCatchAll xmlns="758d0d8f-b783-4c78-ab73-9740c97b97cf" xsi:nil="true"/>
+  </documentManagement>
+</p:properties>
 </file>
 
 <file path=customXml/item2.xml><?xml version="1.0" encoding="utf-8"?>
@@ -23091,20 +23037,27 @@
 </file>
 
 <file path=customXml/item3.xml><?xml version="1.0" encoding="utf-8"?>
-<p:properties xmlns:p="http://schemas.microsoft.com/office/2006/metadata/properties" xmlns:xsi="http://www.w3.org/2001/XMLSchema-instance" xmlns:pc="http://schemas.microsoft.com/office/infopath/2007/PartnerControls">
-  <documentManagement>
-    <lcf76f155ced4ddcb4097134ff3c332f xmlns="40806f44-bc4a-4ea4-b660-c6da93f8f179">
-      <Terms xmlns="http://schemas.microsoft.com/office/infopath/2007/PartnerControls"/>
-    </lcf76f155ced4ddcb4097134ff3c332f>
-    <TaxCatchAll xmlns="758d0d8f-b783-4c78-ab73-9740c97b97cf" xsi:nil="true"/>
-  </documentManagement>
-</p:properties>
+<?mso-contentType ?>
+<FormTemplates xmlns="http://schemas.microsoft.com/sharepoint/v3/contenttype/forms">
+  <Display>DocumentLibraryForm</Display>
+  <Edit>DocumentLibraryForm</Edit>
+  <New>DocumentLibraryForm</New>
+</FormTemplates>
 </file>
 
 <file path=customXml/itemProps1.xml><?xml version="1.0" encoding="utf-8"?>
-<ds:datastoreItem xmlns:ds="http://schemas.openxmlformats.org/officeDocument/2006/customXml" ds:itemID="{46915D30-CAA6-465E-907F-1770D4E3B01D}">
+<ds:datastoreItem xmlns:ds="http://schemas.openxmlformats.org/officeDocument/2006/customXml" ds:itemID="{61E72F81-8533-461E-8E71-A6D77294CFEF}">
   <ds:schemaRefs>
-    <ds:schemaRef ds:uri="http://schemas.microsoft.com/sharepoint/v3/contenttype/forms"/>
+    <ds:schemaRef ds:uri="http://purl.org/dc/elements/1.1/"/>
+    <ds:schemaRef ds:uri="http://www.w3.org/XML/1998/namespace"/>
+    <ds:schemaRef ds:uri="http://purl.org/dc/terms/"/>
+    <ds:schemaRef ds:uri="http://schemas.microsoft.com/office/2006/documentManagement/types"/>
+    <ds:schemaRef ds:uri="40806f44-bc4a-4ea4-b660-c6da93f8f179"/>
+    <ds:schemaRef ds:uri="http://schemas.openxmlformats.org/package/2006/metadata/core-properties"/>
+    <ds:schemaRef ds:uri="http://purl.org/dc/dcmitype/"/>
+    <ds:schemaRef ds:uri="http://schemas.microsoft.com/office/infopath/2007/PartnerControls"/>
+    <ds:schemaRef ds:uri="758d0d8f-b783-4c78-ab73-9740c97b97cf"/>
+    <ds:schemaRef ds:uri="http://schemas.microsoft.com/office/2006/metadata/properties"/>
   </ds:schemaRefs>
 </ds:datastoreItem>
 </file>
@@ -23129,18 +23082,9 @@
 </file>
 
 <file path=customXml/itemProps3.xml><?xml version="1.0" encoding="utf-8"?>
-<ds:datastoreItem xmlns:ds="http://schemas.openxmlformats.org/officeDocument/2006/customXml" ds:itemID="{61E72F81-8533-461E-8E71-A6D77294CFEF}">
+<ds:datastoreItem xmlns:ds="http://schemas.openxmlformats.org/officeDocument/2006/customXml" ds:itemID="{46915D30-CAA6-465E-907F-1770D4E3B01D}">
   <ds:schemaRefs>
-    <ds:schemaRef ds:uri="http://purl.org/dc/elements/1.1/"/>
-    <ds:schemaRef ds:uri="http://www.w3.org/XML/1998/namespace"/>
-    <ds:schemaRef ds:uri="http://purl.org/dc/terms/"/>
-    <ds:schemaRef ds:uri="http://schemas.microsoft.com/office/2006/documentManagement/types"/>
-    <ds:schemaRef ds:uri="40806f44-bc4a-4ea4-b660-c6da93f8f179"/>
-    <ds:schemaRef ds:uri="http://schemas.openxmlformats.org/package/2006/metadata/core-properties"/>
-    <ds:schemaRef ds:uri="http://purl.org/dc/dcmitype/"/>
-    <ds:schemaRef ds:uri="http://schemas.microsoft.com/office/infopath/2007/PartnerControls"/>
-    <ds:schemaRef ds:uri="758d0d8f-b783-4c78-ab73-9740c97b97cf"/>
-    <ds:schemaRef ds:uri="http://schemas.microsoft.com/office/2006/metadata/properties"/>
+    <ds:schemaRef ds:uri="http://schemas.microsoft.com/sharepoint/v3/contenttype/forms"/>
   </ds:schemaRefs>
 </ds:datastoreItem>
 </file>
</xml_diff>